<commit_message>
fixed slides not placed correctly
</commit_message>
<xml_diff>
--- a/Presentation and Documentation/Presentation.pptx
+++ b/Presentation and Documentation/Presentation.pptx
@@ -10612,6 +10612,145 @@
       </p:grpSp>
       <p:grpSp>
         <p:nvGrpSpPr>
+          <p:cNvPr id="19" name="Group 18">
+            <a:extLst>
+              <a:ext uri="{FF2B5EF4-FFF2-40B4-BE49-F238E27FC236}">
+                <a16:creationId xmlns:a16="http://schemas.microsoft.com/office/drawing/2014/main" id="{FFB8A8F9-FC54-4329-B011-50DCD6AE37B4}"/>
+              </a:ext>
+            </a:extLst>
+          </p:cNvPr>
+          <p:cNvGrpSpPr/>
+          <p:nvPr/>
+        </p:nvGrpSpPr>
+        <p:grpSpPr>
+          <a:xfrm>
+            <a:off x="442913" y="0"/>
+            <a:ext cx="12440557" cy="6858000"/>
+            <a:chOff x="190500" y="0"/>
+            <a:chExt cx="12001500" cy="6858000"/>
+          </a:xfrm>
+          <a:solidFill>
+            <a:schemeClr val="accent3"/>
+          </a:solidFill>
+          <a:effectLst>
+            <a:outerShdw blurRad="127000" dist="25400" dir="12780000" algn="ctr" rotWithShape="0">
+              <a:schemeClr val="tx1">
+                <a:alpha val="59000"/>
+              </a:schemeClr>
+            </a:outerShdw>
+          </a:effectLst>
+        </p:grpSpPr>
+        <p:sp>
+          <p:nvSpPr>
+            <p:cNvPr id="18" name="Rectangle 17">
+              <a:extLst>
+                <a:ext uri="{FF2B5EF4-FFF2-40B4-BE49-F238E27FC236}">
+                  <a16:creationId xmlns:a16="http://schemas.microsoft.com/office/drawing/2014/main" id="{BFCA6F2F-D9E6-4220-BCA0-5F1773C75D0B}"/>
+                </a:ext>
+              </a:extLst>
+            </p:cNvPr>
+            <p:cNvSpPr/>
+            <p:nvPr/>
+          </p:nvSpPr>
+          <p:spPr>
+            <a:xfrm>
+              <a:off x="838200" y="0"/>
+              <a:ext cx="11353800" cy="6858000"/>
+            </a:xfrm>
+            <a:prstGeom prst="rect">
+              <a:avLst/>
+            </a:prstGeom>
+            <a:grpFill/>
+            <a:ln>
+              <a:noFill/>
+            </a:ln>
+          </p:spPr>
+          <p:style>
+            <a:lnRef idx="2">
+              <a:schemeClr val="accent1">
+                <a:shade val="50000"/>
+              </a:schemeClr>
+            </a:lnRef>
+            <a:fillRef idx="1">
+              <a:schemeClr val="accent1"/>
+            </a:fillRef>
+            <a:effectRef idx="0">
+              <a:schemeClr val="accent1"/>
+            </a:effectRef>
+            <a:fontRef idx="minor">
+              <a:schemeClr val="lt1"/>
+            </a:fontRef>
+          </p:style>
+          <p:txBody>
+            <a:bodyPr rtlCol="0" anchor="ctr"/>
+            <a:lstStyle/>
+            <a:p>
+              <a:pPr algn="ctr"/>
+              <a:endParaRPr lang="bg-BG"/>
+            </a:p>
+          </p:txBody>
+        </p:sp>
+        <p:sp>
+          <p:nvSpPr>
+            <p:cNvPr id="13" name="Rectangle: Rounded Corners 12">
+              <a:extLst>
+                <a:ext uri="{FF2B5EF4-FFF2-40B4-BE49-F238E27FC236}">
+                  <a16:creationId xmlns:a16="http://schemas.microsoft.com/office/drawing/2014/main" id="{E8B2C438-FDD3-4882-B2EA-EABCE0DE78E6}"/>
+                </a:ext>
+              </a:extLst>
+            </p:cNvPr>
+            <p:cNvSpPr/>
+            <p:nvPr/>
+          </p:nvSpPr>
+          <p:spPr>
+            <a:xfrm>
+              <a:off x="190500" y="1968500"/>
+              <a:ext cx="2184400" cy="838200"/>
+            </a:xfrm>
+            <a:prstGeom prst="roundRect">
+              <a:avLst/>
+            </a:prstGeom>
+            <a:grpFill/>
+            <a:ln>
+              <a:noFill/>
+            </a:ln>
+          </p:spPr>
+          <p:style>
+            <a:lnRef idx="2">
+              <a:schemeClr val="accent1">
+                <a:shade val="50000"/>
+              </a:schemeClr>
+            </a:lnRef>
+            <a:fillRef idx="1">
+              <a:schemeClr val="accent1"/>
+            </a:fillRef>
+            <a:effectRef idx="0">
+              <a:schemeClr val="accent1"/>
+            </a:effectRef>
+            <a:fontRef idx="minor">
+              <a:schemeClr val="lt1"/>
+            </a:fontRef>
+          </p:style>
+          <p:txBody>
+            <a:bodyPr vert="vert270" rtlCol="0" anchor="t"/>
+            <a:lstStyle/>
+            <a:p>
+              <a:pPr algn="ctr"/>
+              <a:r>
+                <a:rPr lang="en-US" dirty="0"/>
+                <a:t>Apps used</a:t>
+              </a:r>
+              <a:endParaRPr lang="bg-BG" dirty="0"/>
+            </a:p>
+            <a:p>
+              <a:pPr algn="ctr"/>
+              <a:endParaRPr lang="bg-BG" dirty="0"/>
+            </a:p>
+          </p:txBody>
+        </p:sp>
+      </p:grpSp>
+      <p:grpSp>
+        <p:nvGrpSpPr>
           <p:cNvPr id="23" name="Group 22">
             <a:extLst>
               <a:ext uri="{FF2B5EF4-FFF2-40B4-BE49-F238E27FC236}">
@@ -10704,145 +10843,6 @@
               <a:extLst>
                 <a:ext uri="{FF2B5EF4-FFF2-40B4-BE49-F238E27FC236}">
                   <a16:creationId xmlns:a16="http://schemas.microsoft.com/office/drawing/2014/main" id="{0172BA64-F84E-4A96-A3B4-03EED0D0E654}"/>
-                </a:ext>
-              </a:extLst>
-            </p:cNvPr>
-            <p:cNvSpPr/>
-            <p:nvPr/>
-          </p:nvSpPr>
-          <p:spPr>
-            <a:xfrm>
-              <a:off x="838200" y="0"/>
-              <a:ext cx="11353800" cy="6858000"/>
-            </a:xfrm>
-            <a:prstGeom prst="rect">
-              <a:avLst/>
-            </a:prstGeom>
-            <a:grpFill/>
-            <a:ln>
-              <a:noFill/>
-            </a:ln>
-          </p:spPr>
-          <p:style>
-            <a:lnRef idx="2">
-              <a:schemeClr val="accent1">
-                <a:shade val="50000"/>
-              </a:schemeClr>
-            </a:lnRef>
-            <a:fillRef idx="1">
-              <a:schemeClr val="accent1"/>
-            </a:fillRef>
-            <a:effectRef idx="0">
-              <a:schemeClr val="accent1"/>
-            </a:effectRef>
-            <a:fontRef idx="minor">
-              <a:schemeClr val="lt1"/>
-            </a:fontRef>
-          </p:style>
-          <p:txBody>
-            <a:bodyPr rtlCol="0" anchor="ctr"/>
-            <a:lstStyle/>
-            <a:p>
-              <a:pPr algn="ctr"/>
-              <a:endParaRPr lang="bg-BG"/>
-            </a:p>
-          </p:txBody>
-        </p:sp>
-      </p:grpSp>
-      <p:grpSp>
-        <p:nvGrpSpPr>
-          <p:cNvPr id="19" name="Group 18">
-            <a:extLst>
-              <a:ext uri="{FF2B5EF4-FFF2-40B4-BE49-F238E27FC236}">
-                <a16:creationId xmlns:a16="http://schemas.microsoft.com/office/drawing/2014/main" id="{FFB8A8F9-FC54-4329-B011-50DCD6AE37B4}"/>
-              </a:ext>
-            </a:extLst>
-          </p:cNvPr>
-          <p:cNvGrpSpPr/>
-          <p:nvPr/>
-        </p:nvGrpSpPr>
-        <p:grpSpPr>
-          <a:xfrm>
-            <a:off x="442913" y="0"/>
-            <a:ext cx="12440557" cy="6858000"/>
-            <a:chOff x="190500" y="0"/>
-            <a:chExt cx="12001500" cy="6858000"/>
-          </a:xfrm>
-          <a:solidFill>
-            <a:schemeClr val="accent3"/>
-          </a:solidFill>
-          <a:effectLst>
-            <a:outerShdw blurRad="127000" dist="25400" dir="12780000" algn="ctr" rotWithShape="0">
-              <a:schemeClr val="tx1">
-                <a:alpha val="59000"/>
-              </a:schemeClr>
-            </a:outerShdw>
-          </a:effectLst>
-        </p:grpSpPr>
-        <p:sp>
-          <p:nvSpPr>
-            <p:cNvPr id="13" name="Rectangle: Rounded Corners 12">
-              <a:extLst>
-                <a:ext uri="{FF2B5EF4-FFF2-40B4-BE49-F238E27FC236}">
-                  <a16:creationId xmlns:a16="http://schemas.microsoft.com/office/drawing/2014/main" id="{E8B2C438-FDD3-4882-B2EA-EABCE0DE78E6}"/>
-                </a:ext>
-              </a:extLst>
-            </p:cNvPr>
-            <p:cNvSpPr/>
-            <p:nvPr/>
-          </p:nvSpPr>
-          <p:spPr>
-            <a:xfrm>
-              <a:off x="190500" y="1968500"/>
-              <a:ext cx="2184400" cy="838200"/>
-            </a:xfrm>
-            <a:prstGeom prst="roundRect">
-              <a:avLst/>
-            </a:prstGeom>
-            <a:grpFill/>
-            <a:ln>
-              <a:noFill/>
-            </a:ln>
-          </p:spPr>
-          <p:style>
-            <a:lnRef idx="2">
-              <a:schemeClr val="accent1">
-                <a:shade val="50000"/>
-              </a:schemeClr>
-            </a:lnRef>
-            <a:fillRef idx="1">
-              <a:schemeClr val="accent1"/>
-            </a:fillRef>
-            <a:effectRef idx="0">
-              <a:schemeClr val="accent1"/>
-            </a:effectRef>
-            <a:fontRef idx="minor">
-              <a:schemeClr val="lt1"/>
-            </a:fontRef>
-          </p:style>
-          <p:txBody>
-            <a:bodyPr vert="vert270" rtlCol="0" anchor="t"/>
-            <a:lstStyle/>
-            <a:p>
-              <a:pPr algn="ctr"/>
-              <a:r>
-                <a:rPr lang="en-US" dirty="0"/>
-                <a:t>Apps used</a:t>
-              </a:r>
-              <a:endParaRPr lang="bg-BG" dirty="0"/>
-            </a:p>
-            <a:p>
-              <a:pPr algn="ctr"/>
-              <a:endParaRPr lang="bg-BG" dirty="0"/>
-            </a:p>
-          </p:txBody>
-        </p:sp>
-        <p:sp>
-          <p:nvSpPr>
-            <p:cNvPr id="18" name="Rectangle 17">
-              <a:extLst>
-                <a:ext uri="{FF2B5EF4-FFF2-40B4-BE49-F238E27FC236}">
-                  <a16:creationId xmlns:a16="http://schemas.microsoft.com/office/drawing/2014/main" id="{BFCA6F2F-D9E6-4220-BCA0-5F1773C75D0B}"/>
                 </a:ext>
               </a:extLst>
             </p:cNvPr>

</xml_diff>